<commit_message>
Final version of Science Week poster
</commit_message>
<xml_diff>
--- a/poster.pptx
+++ b/poster.pptx
@@ -1219,19 +1219,19 @@
     </dgm:pt>
   </dgm:ptLst>
   <dgm:cxnLst>
-    <dgm:cxn modelId="{99AD80CF-1F8C-734D-9457-5EFADAC3C348}" type="presOf" srcId="{06F1FE2A-97BA-4B52-B3A6-E44D1F20CB28}" destId="{B8C15370-9E21-4343-A577-4985C41A0B6E}" srcOrd="0" destOrd="0" presId="urn:microsoft.com/office/officeart/2005/8/layout/hList1"/>
-    <dgm:cxn modelId="{186253DE-59E9-0442-828E-0A9DADA16BF6}" type="presOf" srcId="{E3F02E00-7070-0E43-9316-EF961356FC70}" destId="{6EC96761-7A7E-46B1-9A31-B92F49834D5A}" srcOrd="0" destOrd="1" presId="urn:microsoft.com/office/officeart/2005/8/layout/hList1"/>
+    <dgm:cxn modelId="{443D1ADF-7405-CF4E-8560-095FB3D031E9}" srcId="{06F1FE2A-97BA-4B52-B3A6-E44D1F20CB28}" destId="{ACF68DCF-E3BB-3D4A-AFCE-AAD5E01B6ED5}" srcOrd="1" destOrd="0" parTransId="{B9B24775-8D6F-A049-A88D-8C19808F6226}" sibTransId="{6BD98EED-987C-5349-AD68-C8448D11015F}"/>
     <dgm:cxn modelId="{31D0EEFF-9776-4597-8873-3B56F9091C86}" srcId="{184B56DA-A66C-4DD0-AE11-0A7EBA387E48}" destId="{17AF0C1B-AB46-4643-AAAB-C00D253E5731}" srcOrd="0" destOrd="0" parTransId="{29C3C336-A8CD-48B5-9F85-325299B52A84}" sibTransId="{631D11DF-11B6-487B-8148-E2BF1F9190AD}"/>
     <dgm:cxn modelId="{ACB965C6-1ACF-483C-9C29-8A17C949C706}" srcId="{06F1FE2A-97BA-4B52-B3A6-E44D1F20CB28}" destId="{4640F6E6-EF32-4372-9B3B-2FFD48F9CB5C}" srcOrd="0" destOrd="0" parTransId="{DB4F8E23-BBE6-4AB5-9D82-74F5115D7455}" sibTransId="{55E32D54-3DF3-4F3F-B3B8-1AEE5606EC62}"/>
+    <dgm:cxn modelId="{C9ED1BA3-DFB5-384E-89D3-0A74A1959C39}" type="presOf" srcId="{184B56DA-A66C-4DD0-AE11-0A7EBA387E48}" destId="{E01B3154-0666-4584-9FC4-432DE00CC402}" srcOrd="0" destOrd="0" presId="urn:microsoft.com/office/officeart/2005/8/layout/hList1"/>
+    <dgm:cxn modelId="{FC6EE199-23CF-4307-94F8-FC53916EA51A}" srcId="{425AB2E9-3568-4939-AD20-F42726F09D02}" destId="{06F1FE2A-97BA-4B52-B3A6-E44D1F20CB28}" srcOrd="0" destOrd="0" parTransId="{272155B6-483B-4675-B173-D3F00A201046}" sibTransId="{0CACD921-34CA-4681-87F1-041A98C27B3D}"/>
+    <dgm:cxn modelId="{99AD80CF-1F8C-734D-9457-5EFADAC3C348}" type="presOf" srcId="{06F1FE2A-97BA-4B52-B3A6-E44D1F20CB28}" destId="{B8C15370-9E21-4343-A577-4985C41A0B6E}" srcOrd="0" destOrd="0" presId="urn:microsoft.com/office/officeart/2005/8/layout/hList1"/>
+    <dgm:cxn modelId="{BD461FF5-9002-0649-A958-0948C37CDFB6}" srcId="{184B56DA-A66C-4DD0-AE11-0A7EBA387E48}" destId="{E3F02E00-7070-0E43-9316-EF961356FC70}" srcOrd="1" destOrd="0" parTransId="{FA522470-D538-3747-8147-C28F1296C9EB}" sibTransId="{BE1F8DE1-0DDB-6540-9EEA-3343C02E2941}"/>
     <dgm:cxn modelId="{99E25124-8967-D342-8A37-F7CC38C7B58D}" type="presOf" srcId="{4640F6E6-EF32-4372-9B3B-2FFD48F9CB5C}" destId="{DE65B54D-BB89-4898-B770-68834B90CB27}" srcOrd="0" destOrd="0" presId="urn:microsoft.com/office/officeart/2005/8/layout/hList1"/>
     <dgm:cxn modelId="{01AD485A-0916-4A80-9CBA-29870F4D202A}" srcId="{425AB2E9-3568-4939-AD20-F42726F09D02}" destId="{184B56DA-A66C-4DD0-AE11-0A7EBA387E48}" srcOrd="1" destOrd="0" parTransId="{3C1C544F-4C0C-4E19-A3D2-C3E5175D7B4B}" sibTransId="{8EE144C8-20EA-43DA-B048-41CEE06807BC}"/>
-    <dgm:cxn modelId="{C9ED1BA3-DFB5-384E-89D3-0A74A1959C39}" type="presOf" srcId="{184B56DA-A66C-4DD0-AE11-0A7EBA387E48}" destId="{E01B3154-0666-4584-9FC4-432DE00CC402}" srcOrd="0" destOrd="0" presId="urn:microsoft.com/office/officeart/2005/8/layout/hList1"/>
+    <dgm:cxn modelId="{51AFDE21-5218-EE44-B934-41D27FEAFDDC}" type="presOf" srcId="{ACF68DCF-E3BB-3D4A-AFCE-AAD5E01B6ED5}" destId="{DE65B54D-BB89-4898-B770-68834B90CB27}" srcOrd="0" destOrd="1" presId="urn:microsoft.com/office/officeart/2005/8/layout/hList1"/>
     <dgm:cxn modelId="{64EF5B11-A97E-8E44-95A5-E6A549710EB3}" type="presOf" srcId="{425AB2E9-3568-4939-AD20-F42726F09D02}" destId="{4351CFC8-37EC-494B-A841-287649776134}" srcOrd="0" destOrd="0" presId="urn:microsoft.com/office/officeart/2005/8/layout/hList1"/>
     <dgm:cxn modelId="{457776DE-A694-954A-B189-F3FD75C88253}" type="presOf" srcId="{17AF0C1B-AB46-4643-AAAB-C00D253E5731}" destId="{6EC96761-7A7E-46B1-9A31-B92F49834D5A}" srcOrd="0" destOrd="0" presId="urn:microsoft.com/office/officeart/2005/8/layout/hList1"/>
-    <dgm:cxn modelId="{443D1ADF-7405-CF4E-8560-095FB3D031E9}" srcId="{06F1FE2A-97BA-4B52-B3A6-E44D1F20CB28}" destId="{ACF68DCF-E3BB-3D4A-AFCE-AAD5E01B6ED5}" srcOrd="1" destOrd="0" parTransId="{B9B24775-8D6F-A049-A88D-8C19808F6226}" sibTransId="{6BD98EED-987C-5349-AD68-C8448D11015F}"/>
-    <dgm:cxn modelId="{FC6EE199-23CF-4307-94F8-FC53916EA51A}" srcId="{425AB2E9-3568-4939-AD20-F42726F09D02}" destId="{06F1FE2A-97BA-4B52-B3A6-E44D1F20CB28}" srcOrd="0" destOrd="0" parTransId="{272155B6-483B-4675-B173-D3F00A201046}" sibTransId="{0CACD921-34CA-4681-87F1-041A98C27B3D}"/>
-    <dgm:cxn modelId="{51AFDE21-5218-EE44-B934-41D27FEAFDDC}" type="presOf" srcId="{ACF68DCF-E3BB-3D4A-AFCE-AAD5E01B6ED5}" destId="{DE65B54D-BB89-4898-B770-68834B90CB27}" srcOrd="0" destOrd="1" presId="urn:microsoft.com/office/officeart/2005/8/layout/hList1"/>
-    <dgm:cxn modelId="{BD461FF5-9002-0649-A958-0948C37CDFB6}" srcId="{184B56DA-A66C-4DD0-AE11-0A7EBA387E48}" destId="{E3F02E00-7070-0E43-9316-EF961356FC70}" srcOrd="1" destOrd="0" parTransId="{FA522470-D538-3747-8147-C28F1296C9EB}" sibTransId="{BE1F8DE1-0DDB-6540-9EEA-3343C02E2941}"/>
+    <dgm:cxn modelId="{186253DE-59E9-0442-828E-0A9DADA16BF6}" type="presOf" srcId="{E3F02E00-7070-0E43-9316-EF961356FC70}" destId="{6EC96761-7A7E-46B1-9A31-B92F49834D5A}" srcOrd="0" destOrd="1" presId="urn:microsoft.com/office/officeart/2005/8/layout/hList1"/>
     <dgm:cxn modelId="{D5DDC686-E758-254B-8398-BB1BB5C1F72D}" type="presParOf" srcId="{4351CFC8-37EC-494B-A841-287649776134}" destId="{70E9962D-05C5-4F85-A473-03B50B9C6416}" srcOrd="0" destOrd="0" presId="urn:microsoft.com/office/officeart/2005/8/layout/hList1"/>
     <dgm:cxn modelId="{186B6B50-92CB-6848-A20D-B4015D9FE9BA}" type="presParOf" srcId="{70E9962D-05C5-4F85-A473-03B50B9C6416}" destId="{B8C15370-9E21-4343-A577-4985C41A0B6E}" srcOrd="0" destOrd="0" presId="urn:microsoft.com/office/officeart/2005/8/layout/hList1"/>
     <dgm:cxn modelId="{1E747653-C9A4-3042-BE73-DA9B65CE5432}" type="presParOf" srcId="{70E9962D-05C5-4F85-A473-03B50B9C6416}" destId="{DE65B54D-BB89-4898-B770-68834B90CB27}" srcOrd="1" destOrd="0" presId="urn:microsoft.com/office/officeart/2005/8/layout/hList1"/>
@@ -2971,7 +2971,7 @@
           <a:p>
             <a:fld id="{F1C0B079-A316-4C9B-B165-DF9EA8325D2C}" type="datetimeFigureOut">
               <a:rPr lang="en-US" smtClean="0"/>
-              <a:t>8/14/14</a:t>
+              <a:t>8/25/14</a:t>
             </a:fld>
             <a:endParaRPr lang="en-US"/>
           </a:p>
@@ -3136,7 +3136,7 @@
           <a:p>
             <a:fld id="{38F28AB8-57D1-494F-9851-055AD867E790}" type="datetimeFigureOut">
               <a:rPr lang="en-US" smtClean="0"/>
-              <a:t>8/14/14</a:t>
+              <a:t>8/25/14</a:t>
             </a:fld>
             <a:endParaRPr lang="en-US"/>
           </a:p>
@@ -6081,7 +6081,7 @@
           <a:p>
             <a:fld id="{ECAA57DF-1C19-4726-AB84-014692BAD8F5}" type="datetimeFigureOut">
               <a:rPr lang="en-US" smtClean="0"/>
-              <a:t>8/14/14</a:t>
+              <a:t>8/25/14</a:t>
             </a:fld>
             <a:endParaRPr lang="en-US"/>
           </a:p>
@@ -6427,7 +6427,7 @@
             <a:fld id="{ECAA57DF-1C19-4726-AB84-014692BAD8F5}" type="datetimeFigureOut">
               <a:rPr lang="en-US" smtClean="0"/>
               <a:pPr/>
-              <a:t>8/14/14</a:t>
+              <a:t>8/25/14</a:t>
             </a:fld>
             <a:endParaRPr lang="en-US"/>
           </a:p>
@@ -7045,39 +7045,15 @@
                   <a:schemeClr val="bg1"/>
                 </a:solidFill>
               </a:rPr>
-              <a:t>Monta</a:t>
-            </a:r>
-            <a:r>
-              <a:rPr lang="en-US" sz="4000" dirty="0" err="1" smtClean="0">
+              <a:t>Montañez</a:t>
+            </a:r>
+            <a:r>
+              <a:rPr lang="en-US" sz="4000" dirty="0" smtClean="0">
                 <a:solidFill>
                   <a:schemeClr val="bg1"/>
                 </a:solidFill>
               </a:rPr>
-              <a:t>ñ</a:t>
-            </a:r>
-            <a:r>
-              <a:rPr lang="en-US" sz="4000" dirty="0" err="1" smtClean="0">
-                <a:solidFill>
-                  <a:schemeClr val="bg1"/>
-                </a:solidFill>
-              </a:rPr>
-              <a:t>ez</a:t>
-            </a:r>
-            <a:r>
-              <a:rPr lang="en-US" sz="4000" dirty="0" smtClean="0">
-                <a:solidFill>
-                  <a:schemeClr val="bg1"/>
-                </a:solidFill>
-              </a:rPr>
-              <a:t> (Carnegie Mellon University) </a:t>
-            </a:r>
-            <a:r>
-              <a:rPr lang="en-US" sz="4000" dirty="0" smtClean="0">
-                <a:solidFill>
-                  <a:schemeClr val="bg1"/>
-                </a:solidFill>
-              </a:rPr>
-              <a:t>| </a:t>
+              <a:t> (Carnegie Mellon University) | </a:t>
             </a:r>
             <a:r>
               <a:rPr lang="en-US" sz="4000" dirty="0" err="1" smtClean="0">
@@ -7196,9 +7172,8 @@
             </a:r>
             <a:r>
               <a:rPr lang="en-US" sz="4000" dirty="0" smtClean="0"/>
-              <a:t>signals, seeking to understand them.</a:t>
-            </a:r>
-            <a:endParaRPr lang="en-US" sz="4000" dirty="0" smtClean="0"/>
+              <a:t>signals for advanced analytics.</a:t>
+            </a:r>
           </a:p>
           <a:p>
             <a:r>
@@ -7215,11 +7190,7 @@
             </a:r>
             <a:r>
               <a:rPr lang="en-US" sz="4000" dirty="0" smtClean="0"/>
-              <a:t>and</a:t>
-            </a:r>
-            <a:r>
-              <a:rPr lang="en-US" sz="4000" dirty="0" smtClean="0"/>
-              <a:t> map segments to a small number of states. </a:t>
+              <a:t>and map segments to a small number of states. </a:t>
             </a:r>
             <a:endParaRPr lang="en-US" sz="4000" dirty="0"/>
           </a:p>
@@ -7277,14 +7248,12 @@
               <a:rPr lang="en-US" dirty="0" smtClean="0"/>
               <a:t>Work well for segmenting sequential data.</a:t>
             </a:r>
-            <a:endParaRPr lang="en-US" dirty="0" smtClean="0"/>
           </a:p>
           <a:p>
             <a:r>
               <a:rPr lang="en-US" dirty="0" smtClean="0"/>
               <a:t>However, may over-segment.</a:t>
             </a:r>
-            <a:endParaRPr lang="en-US" dirty="0" smtClean="0"/>
           </a:p>
           <a:p>
             <a:r>
@@ -7350,11 +7319,7 @@
             </a:pPr>
             <a:r>
               <a:rPr lang="en-US" dirty="0" smtClean="0"/>
-              <a:t>Two</a:t>
-            </a:r>
-            <a:r>
-              <a:rPr lang="en-US" dirty="0" smtClean="0"/>
-              <a:t> models which impose state persistence through a change to the likelihood model and corresponding expectation maximization (EM) update equations.</a:t>
+              <a:t>Two models which impose state persistence through a change to the likelihood model and corresponding expectation maximization (EM) update equations.</a:t>
             </a:r>
           </a:p>
         </p:txBody>
@@ -7977,7 +7942,6 @@
               <a:rPr lang="en-US" dirty="0"/>
               <a:t>, The Annals of Applied Statistics 5 (2011), no. 2A, 1020–1056. </a:t>
             </a:r>
-            <a:endParaRPr lang="en-US" dirty="0"/>
           </a:p>
         </p:txBody>
       </p:sp>
@@ -8159,7 +8123,7 @@
           <a:graphicData uri="http://schemas.openxmlformats.org/presentationml/2006/ole">
             <mc:AlternateContent xmlns:mc="http://schemas.openxmlformats.org/markup-compatibility/2006">
               <mc:Choice xmlns:v="urn:schemas-microsoft-com:vml" Requires="v">
-                <p:oleObj spid="_x0000_s1048" name="Equation" r:id="rId12" imgW="1993900" imgH="584200" progId="Equation.3">
+                <p:oleObj spid="_x0000_s1052" name="Equation" r:id="rId12" imgW="1993900" imgH="584200" progId="Equation.3">
                   <p:embed/>
                 </p:oleObj>
               </mc:Choice>
@@ -8383,13 +8347,19 @@
                 <a:ea typeface="Lucida Grande"/>
                 <a:cs typeface="Lucida Grande"/>
               </a:rPr>
-              <a:t>– parameter, for “stickiness” of states.</a:t>
-            </a:r>
-          </a:p>
-          <a:p>
+              <a:t>– </a:t>
+            </a:r>
             <a:r>
               <a:rPr lang="en-US" sz="3000" dirty="0" smtClean="0">
-                <a:latin typeface="Lucida Grande"/>
+                <a:ea typeface="Lucida Grande"/>
+                <a:cs typeface="Lucida Grande"/>
+              </a:rPr>
+              <a:t>parameter, for “stickiness” of states.</a:t>
+            </a:r>
+          </a:p>
+          <a:p>
+            <a:r>
+              <a:rPr lang="en-US" sz="3000" dirty="0" smtClean="0">
                 <a:ea typeface="Lucida Grande"/>
                 <a:cs typeface="Lucida Grande"/>
               </a:rPr>
@@ -8397,7 +8367,6 @@
             </a:r>
             <a:r>
               <a:rPr lang="en-US" sz="3000" i="1" dirty="0" smtClean="0">
-                <a:latin typeface="Lucida Grande"/>
                 <a:ea typeface="Lucida Grande"/>
                 <a:cs typeface="Lucida Grande"/>
               </a:rPr>
@@ -8405,7 +8374,6 @@
             </a:r>
             <a:r>
               <a:rPr lang="en-US" sz="3000" dirty="0" smtClean="0">
-                <a:latin typeface="Lucida Grande"/>
                 <a:ea typeface="Lucida Grande"/>
                 <a:cs typeface="Lucida Grande"/>
               </a:rPr>
@@ -8514,7 +8482,6 @@
               <a:rPr lang="en-US" sz="2800" dirty="0" smtClean="0"/>
               <a:t>MAP Inertial HMM – Example Segmentation</a:t>
             </a:r>
-            <a:endParaRPr lang="en-US" sz="2800" dirty="0" smtClean="0"/>
           </a:p>
         </p:txBody>
       </p:sp>
@@ -8570,15 +8537,7 @@
           <a:p>
             <a:r>
               <a:rPr lang="en-US" dirty="0" smtClean="0"/>
-              <a:t>Automated parameter selection </a:t>
-            </a:r>
-            <a:r>
-              <a:rPr lang="en-US" dirty="0" smtClean="0"/>
-              <a:t>for inertial HMMs</a:t>
-            </a:r>
-            <a:r>
-              <a:rPr lang="en-US" dirty="0" smtClean="0"/>
-              <a:t>.</a:t>
+              <a:t>Automated parameter selection for inertial HMMs.</a:t>
             </a:r>
           </a:p>
           <a:p>
@@ -8587,14 +8546,12 @@
               <a:rPr lang="en-US" dirty="0" smtClean="0"/>
               <a:t>Used to select parameters in Results section.</a:t>
             </a:r>
-            <a:endParaRPr lang="en-US" dirty="0" smtClean="0"/>
           </a:p>
           <a:p>
             <a:r>
               <a:rPr lang="en-US" dirty="0" smtClean="0"/>
               <a:t>Online learning of inertial HMM model.</a:t>
             </a:r>
-            <a:endParaRPr lang="en-US" dirty="0" smtClean="0"/>
           </a:p>
         </p:txBody>
       </p:sp>
@@ -8652,7 +8609,6 @@
               <a:rPr lang="en-US" dirty="0" smtClean="0"/>
               <a:t>Works well on synthetic and real-world data.</a:t>
             </a:r>
-            <a:endParaRPr lang="en-US" dirty="0" smtClean="0"/>
           </a:p>
           <a:p>
             <a:r>
@@ -8676,11 +8632,7 @@
             <a:pPr lvl="0"/>
             <a:r>
               <a:rPr lang="en-US" dirty="0" smtClean="0"/>
-              <a:t>D</a:t>
-            </a:r>
-            <a:r>
-              <a:rPr lang="en-US" dirty="0" smtClean="0"/>
-              <a:t>oes not suffer from extreme sensitivity to parameter settings, as does sticky HDP-HMM.</a:t>
+              <a:t>Does not suffer from extreme sensitivity to parameter settings, as does sticky HDP-HMM.</a:t>
             </a:r>
             <a:endParaRPr lang="en-US" dirty="0"/>
           </a:p>

</xml_diff>

<commit_message>
updated poster with title and grammer fixes
</commit_message>
<xml_diff>
--- a/poster.pptx
+++ b/poster.pptx
@@ -112,10 +112,10 @@
   </p:defaultTextStyle>
   <p:extLst>
     <p:ext uri="{EFAFB233-063F-42B5-8137-9DF3F51BA10A}">
-      <p15:sldGuideLst xmlns:p15="http://schemas.microsoft.com/office/powerpoint/2012/main" xmlns=""/>
+      <p15:sldGuideLst xmlns="" xmlns:p15="http://schemas.microsoft.com/office/powerpoint/2012/main"/>
     </p:ext>
     <p:ext uri="{2D200454-40CA-4A62-9FC3-DE9A4176ACB9}">
-      <p15:notesGuideLst xmlns:p15="http://schemas.microsoft.com/office/powerpoint/2012/main" xmlns=""/>
+      <p15:notesGuideLst xmlns="" xmlns:p15="http://schemas.microsoft.com/office/powerpoint/2012/main"/>
     </p:ext>
   </p:extLst>
 </p:presentation>
@@ -2971,7 +2971,7 @@
           <a:p>
             <a:fld id="{F1C0B079-A316-4C9B-B165-DF9EA8325D2C}" type="datetimeFigureOut">
               <a:rPr lang="en-US" smtClean="0"/>
-              <a:t>8/25/14</a:t>
+              <a:t>1/7/15</a:t>
             </a:fld>
             <a:endParaRPr lang="en-US"/>
           </a:p>
@@ -3136,7 +3136,7 @@
           <a:p>
             <a:fld id="{38F28AB8-57D1-494F-9851-055AD867E790}" type="datetimeFigureOut">
               <a:rPr lang="en-US" smtClean="0"/>
-              <a:t>8/25/14</a:t>
+              <a:t>1/7/15</a:t>
             </a:fld>
             <a:endParaRPr lang="en-US"/>
           </a:p>
@@ -6081,7 +6081,7 @@
           <a:p>
             <a:fld id="{ECAA57DF-1C19-4726-AB84-014692BAD8F5}" type="datetimeFigureOut">
               <a:rPr lang="en-US" smtClean="0"/>
-              <a:t>8/25/14</a:t>
+              <a:t>1/7/15</a:t>
             </a:fld>
             <a:endParaRPr lang="en-US"/>
           </a:p>
@@ -6211,7 +6211,7 @@
   </p:timing>
   <p:extLst mod="1">
     <p:ext uri="{DCECCB84-F9BA-43D5-87BE-67443E8EF086}">
-      <p15:sldGuideLst xmlns:p15="http://schemas.microsoft.com/office/powerpoint/2012/main" xmlns="">
+      <p15:sldGuideLst xmlns="" xmlns:p15="http://schemas.microsoft.com/office/powerpoint/2012/main">
         <p15:guide id="1" pos="9168" userDrawn="1">
           <p15:clr>
             <a:srgbClr val="A4A3A4"/>
@@ -6427,7 +6427,7 @@
             <a:fld id="{ECAA57DF-1C19-4726-AB84-014692BAD8F5}" type="datetimeFigureOut">
               <a:rPr lang="en-US" smtClean="0"/>
               <a:pPr/>
-              <a:t>8/25/14</a:t>
+              <a:t>1/7/15</a:t>
             </a:fld>
             <a:endParaRPr lang="en-US"/>
           </a:p>
@@ -6932,7 +6932,7 @@
   </p:txStyles>
   <p:extLst mod="1">
     <p:ext uri="{27BBF7A9-308A-43DC-89C8-2F10F3537804}">
-      <p15:sldGuideLst xmlns:p15="http://schemas.microsoft.com/office/powerpoint/2012/main" xmlns="">
+      <p15:sldGuideLst xmlns="" xmlns:p15="http://schemas.microsoft.com/office/powerpoint/2012/main">
         <p15:guide id="1" orient="horz" pos="10368" userDrawn="1">
           <p15:clr>
             <a:srgbClr val="A4A3A4"/>
@@ -7000,10 +7000,19 @@
           <a:p>
             <a:pPr algn="ctr"/>
             <a:r>
-              <a:rPr lang="en-US" sz="9600" dirty="0" smtClean="0">
-                <a:cs typeface="Avenir Black"/>
-              </a:rPr>
-              <a:t>SEGMENTING MULTIVARIATE TIME SERIES WITH INERTIAL HMMS</a:t>
+              <a:rPr lang="en-US" sz="9600" dirty="0"/>
+              <a:t>Inertial Hidden Markov Models: </a:t>
+            </a:r>
+            <a:br>
+              <a:rPr lang="en-US" sz="9600" dirty="0"/>
+            </a:br>
+            <a:r>
+              <a:rPr lang="en-US" sz="9600" dirty="0"/>
+              <a:t>Modeling Change in Multivariate Time </a:t>
+            </a:r>
+            <a:r>
+              <a:rPr lang="en-US" sz="9600" dirty="0" smtClean="0"/>
+              <a:t>Series</a:t>
             </a:r>
             <a:endParaRPr lang="en-US" dirty="0">
               <a:cs typeface="Avenir Black"/>
@@ -7246,7 +7255,11 @@
           <a:p>
             <a:r>
               <a:rPr lang="en-US" dirty="0" smtClean="0"/>
-              <a:t>Work well for segmenting sequential data.</a:t>
+              <a:t>Works </a:t>
+            </a:r>
+            <a:r>
+              <a:rPr lang="en-US" dirty="0" smtClean="0"/>
+              <a:t>well for segmenting sequential data.</a:t>
             </a:r>
           </a:p>
           <a:p>
@@ -8123,7 +8136,7 @@
           <a:graphicData uri="http://schemas.openxmlformats.org/presentationml/2006/ole">
             <mc:AlternateContent xmlns:mc="http://schemas.openxmlformats.org/markup-compatibility/2006">
               <mc:Choice xmlns:v="urn:schemas-microsoft-com:vml" Requires="v">
-                <p:oleObj spid="_x0000_s1052" name="Equation" r:id="rId12" imgW="1993900" imgH="584200" progId="Equation.3">
+                <p:oleObj spid="_x0000_s1054" name="Equation" r:id="rId12" imgW="1993900" imgH="584200" progId="Equation.3">
                   <p:embed/>
                 </p:oleObj>
               </mc:Choice>
@@ -9052,7 +9065,7 @@
   <a:extraClrSchemeLst/>
   <a:extLst>
     <a:ext uri="{05A4C25C-085E-4340-85A3-A5531E510DB2}">
-      <thm15:themeFamily xmlns:thm15="http://schemas.microsoft.com/office/thememl/2012/main" xmlns="" name="Presentation2" id="{A3AC1795-03CA-4218-8E9C-394F2C72EB71}" vid="{9E91E023-53D0-48CE-AFD1-CE3DA49243D0}"/>
+      <thm15:themeFamily xmlns="" xmlns:thm15="http://schemas.microsoft.com/office/thememl/2012/main" name="Presentation2" id="{A3AC1795-03CA-4218-8E9C-394F2C72EB71}" vid="{9E91E023-53D0-48CE-AFD1-CE3DA49243D0}"/>
     </a:ext>
   </a:extLst>
 </a:theme>
@@ -9313,7 +9326,7 @@
   <a:extraClrSchemeLst/>
   <a:extLst>
     <a:ext uri="{05A4C25C-085E-4340-85A3-A5531E510DB2}">
-      <thm15:themeFamily xmlns:thm15="http://schemas.microsoft.com/office/thememl/2012/main" xmlns="" name="Office Theme" id="{62F939B6-93AF-4DB8-9C6B-D6C7DFDC589F}" vid="{4A3C46E8-61CC-4603-A589-7422A47A8E4A}"/>
+      <thm15:themeFamily xmlns="" xmlns:thm15="http://schemas.microsoft.com/office/thememl/2012/main" name="Office Theme" id="{62F939B6-93AF-4DB8-9C6B-D6C7DFDC589F}" vid="{4A3C46E8-61CC-4603-A589-7422A47A8E4A}"/>
     </a:ext>
   </a:extLst>
 </a:theme>
@@ -9574,7 +9587,7 @@
   <a:extraClrSchemeLst/>
   <a:extLst>
     <a:ext uri="{05A4C25C-085E-4340-85A3-A5531E510DB2}">
-      <thm15:themeFamily xmlns:thm15="http://schemas.microsoft.com/office/thememl/2012/main" xmlns="" name="Office Theme" id="{62F939B6-93AF-4DB8-9C6B-D6C7DFDC589F}" vid="{4A3C46E8-61CC-4603-A589-7422A47A8E4A}"/>
+      <thm15:themeFamily xmlns="" xmlns:thm15="http://schemas.microsoft.com/office/thememl/2012/main" name="Office Theme" id="{62F939B6-93AF-4DB8-9C6B-D6C7DFDC589F}" vid="{4A3C46E8-61CC-4603-A589-7422A47A8E4A}"/>
     </a:ext>
   </a:extLst>
 </a:theme>

</xml_diff>

<commit_message>
Final changes to poster for AAAI 2015
</commit_message>
<xml_diff>
--- a/poster.pptx
+++ b/poster.pptx
@@ -112,10 +112,10 @@
   </p:defaultTextStyle>
   <p:extLst>
     <p:ext uri="{EFAFB233-063F-42B5-8137-9DF3F51BA10A}">
-      <p15:sldGuideLst xmlns:p15="http://schemas.microsoft.com/office/powerpoint/2012/main" xmlns=""/>
+      <p15:sldGuideLst xmlns="" xmlns:p15="http://schemas.microsoft.com/office/powerpoint/2012/main"/>
     </p:ext>
     <p:ext uri="{2D200454-40CA-4A62-9FC3-DE9A4176ACB9}">
-      <p15:notesGuideLst xmlns:p15="http://schemas.microsoft.com/office/powerpoint/2012/main" xmlns=""/>
+      <p15:notesGuideLst xmlns="" xmlns:p15="http://schemas.microsoft.com/office/powerpoint/2012/main"/>
     </p:ext>
   </p:extLst>
 </p:presentation>
@@ -2971,7 +2971,7 @@
           <a:p>
             <a:fld id="{F1C0B079-A316-4C9B-B165-DF9EA8325D2C}" type="datetimeFigureOut">
               <a:rPr lang="en-US" smtClean="0"/>
-              <a:t>1/7/15</a:t>
+              <a:t>1/13/2015</a:t>
             </a:fld>
             <a:endParaRPr lang="en-US"/>
           </a:p>
@@ -3136,7 +3136,7 @@
           <a:p>
             <a:fld id="{38F28AB8-57D1-494F-9851-055AD867E790}" type="datetimeFigureOut">
               <a:rPr lang="en-US" smtClean="0"/>
-              <a:t>1/7/15</a:t>
+              <a:t>1/13/2015</a:t>
             </a:fld>
             <a:endParaRPr lang="en-US"/>
           </a:p>
@@ -6081,7 +6081,7 @@
           <a:p>
             <a:fld id="{ECAA57DF-1C19-4726-AB84-014692BAD8F5}" type="datetimeFigureOut">
               <a:rPr lang="en-US" smtClean="0"/>
-              <a:t>1/7/15</a:t>
+              <a:t>1/13/2015</a:t>
             </a:fld>
             <a:endParaRPr lang="en-US"/>
           </a:p>
@@ -6205,13 +6205,13 @@
   <p:timing>
     <p:tnLst>
       <p:par>
-        <p:cTn xmlns:p14="http://schemas.microsoft.com/office/powerpoint/2010/main" id="1" dur="indefinite" restart="never" nodeType="tmRoot"/>
+        <p:cTn id="1" dur="indefinite" restart="never" nodeType="tmRoot"/>
       </p:par>
     </p:tnLst>
   </p:timing>
   <p:extLst mod="1">
     <p:ext uri="{DCECCB84-F9BA-43D5-87BE-67443E8EF086}">
-      <p15:sldGuideLst xmlns:p15="http://schemas.microsoft.com/office/powerpoint/2012/main" xmlns="">
+      <p15:sldGuideLst xmlns="" xmlns:p15="http://schemas.microsoft.com/office/powerpoint/2012/main">
         <p15:guide id="1" pos="9168" userDrawn="1">
           <p15:clr>
             <a:srgbClr val="A4A3A4"/>
@@ -6427,7 +6427,7 @@
             <a:fld id="{ECAA57DF-1C19-4726-AB84-014692BAD8F5}" type="datetimeFigureOut">
               <a:rPr lang="en-US" smtClean="0"/>
               <a:pPr/>
-              <a:t>1/7/15</a:t>
+              <a:t>1/13/2015</a:t>
             </a:fld>
             <a:endParaRPr lang="en-US"/>
           </a:p>
@@ -6932,7 +6932,7 @@
   </p:txStyles>
   <p:extLst mod="1">
     <p:ext uri="{27BBF7A9-308A-43DC-89C8-2F10F3537804}">
-      <p15:sldGuideLst xmlns:p15="http://schemas.microsoft.com/office/powerpoint/2012/main" xmlns="">
+      <p15:sldGuideLst xmlns="" xmlns:p15="http://schemas.microsoft.com/office/powerpoint/2012/main">
         <p15:guide id="1" orient="horz" pos="10368" userDrawn="1">
           <p15:clr>
             <a:srgbClr val="A4A3A4"/>
@@ -7092,23 +7092,7 @@
                   <a:schemeClr val="bg1"/>
                 </a:solidFill>
               </a:rPr>
-              <a:t> (Carnegie Mellon University) | Saeed Amizadeh (</a:t>
-            </a:r>
-            <a:r>
-              <a:rPr lang="en-US" sz="4000" dirty="0" smtClean="0">
-                <a:solidFill>
-                  <a:schemeClr val="bg1"/>
-                </a:solidFill>
-              </a:rPr>
-              <a:t>Yahoo </a:t>
-            </a:r>
-            <a:r>
-              <a:rPr lang="en-US" sz="4000" dirty="0" smtClean="0">
-                <a:solidFill>
-                  <a:schemeClr val="bg1"/>
-                </a:solidFill>
-              </a:rPr>
-              <a:t>Labs) | </a:t>
+              <a:t> (Carnegie Mellon University) | Saeed Amizadeh (Yahoo Labs) | </a:t>
             </a:r>
             <a:r>
               <a:rPr lang="en-US" sz="4000" dirty="0" err="1" smtClean="0">
@@ -7124,23 +7108,7 @@
                   <a:schemeClr val="bg1"/>
                 </a:solidFill>
               </a:rPr>
-              <a:t> Laptev (</a:t>
-            </a:r>
-            <a:r>
-              <a:rPr lang="en-US" sz="4000" dirty="0" smtClean="0">
-                <a:solidFill>
-                  <a:schemeClr val="bg1"/>
-                </a:solidFill>
-              </a:rPr>
-              <a:t>Yahoo </a:t>
-            </a:r>
-            <a:r>
-              <a:rPr lang="en-US" sz="4000" dirty="0" smtClean="0">
-                <a:solidFill>
-                  <a:schemeClr val="bg1"/>
-                </a:solidFill>
-              </a:rPr>
-              <a:t>Labs)</a:t>
+              <a:t> Laptev (Yahoo Labs)</a:t>
             </a:r>
             <a:endParaRPr lang="en-US" sz="4000" dirty="0">
               <a:solidFill>
@@ -7229,11 +7197,7 @@
             </a:r>
             <a:r>
               <a:rPr lang="en-US" sz="4000" dirty="0" smtClean="0"/>
-              <a:t>and map segments to a small number of </a:t>
-            </a:r>
-            <a:r>
-              <a:rPr lang="en-US" sz="4000" dirty="0" smtClean="0"/>
-              <a:t>states with </a:t>
+              <a:t>and map segments to a small number of states with </a:t>
             </a:r>
             <a:r>
               <a:rPr lang="en-US" sz="4000" i="1" dirty="0" smtClean="0">
@@ -7309,13 +7273,8 @@
           <a:p>
             <a:r>
               <a:rPr lang="en-US" dirty="0" smtClean="0"/>
-              <a:t>However, may over-</a:t>
-            </a:r>
-            <a:r>
-              <a:rPr lang="en-US" dirty="0" smtClean="0"/>
-              <a:t>segment leading to frequent state transitions.</a:t>
-            </a:r>
-            <a:endParaRPr lang="en-US" dirty="0" smtClean="0"/>
+              <a:t>However, may over-segment leading to frequent state transitions.</a:t>
+            </a:r>
           </a:p>
           <a:p>
             <a:r>
@@ -7424,14 +7383,14 @@
             <p:ph sz="quarter" idx="27"/>
             <p:extLst>
               <p:ext uri="{D42A27DB-BD31-4B8C-83A1-F6EECF244321}">
-                <p14:modId xmlns:p14="http://schemas.microsoft.com/office/powerpoint/2010/main" val="1400481550"/>
+                <p14:modId xmlns:p14="http://schemas.microsoft.com/office/powerpoint/2010/main" val="954290909"/>
               </p:ext>
             </p:extLst>
           </p:nvPr>
         </p:nvGraphicFramePr>
         <p:xfrm>
           <a:off x="11658600" y="27933580"/>
-          <a:ext cx="9601200" cy="4499529"/>
+          <a:ext cx="9601200" cy="4499530"/>
         </p:xfrm>
         <a:graphic>
           <a:graphicData uri="http://schemas.openxmlformats.org/drawingml/2006/table">
@@ -7586,7 +7545,7 @@
                       <a:pPr algn="ctr"/>
                       <a:r>
                         <a:rPr lang="en-US" sz="2800" dirty="0" smtClean="0"/>
-                        <a:t>0.59</a:t>
+                        <a:t>0.60</a:t>
                       </a:r>
                       <a:endParaRPr lang="en-US" sz="2800" dirty="0"/>
                     </a:p>
@@ -7601,7 +7560,7 @@
                       <a:pPr algn="ctr"/>
                       <a:r>
                         <a:rPr lang="en-US" sz="2800" dirty="0" smtClean="0"/>
-                        <a:t>0.97</a:t>
+                        <a:t>0.95</a:t>
                       </a:r>
                       <a:endParaRPr lang="en-US" sz="2800" dirty="0"/>
                     </a:p>
@@ -8172,25 +8131,25 @@
           <p:nvPr>
             <p:extLst>
               <p:ext uri="{D42A27DB-BD31-4B8C-83A1-F6EECF244321}">
-                <p14:modId xmlns:p14="http://schemas.microsoft.com/office/powerpoint/2010/main" val="1486070101"/>
+                <p14:modId xmlns:p14="http://schemas.microsoft.com/office/powerpoint/2010/main" val="560463454"/>
               </p:ext>
             </p:extLst>
           </p:nvPr>
         </p:nvGraphicFramePr>
         <p:xfrm>
-          <a:off x="694597" y="29792372"/>
-          <a:ext cx="9972815" cy="2662493"/>
+          <a:off x="854075" y="30022800"/>
+          <a:ext cx="9655175" cy="2200275"/>
         </p:xfrm>
         <a:graphic>
           <a:graphicData uri="http://schemas.openxmlformats.org/presentationml/2006/ole">
             <mc:AlternateContent xmlns:mc="http://schemas.openxmlformats.org/markup-compatibility/2006">
               <mc:Choice xmlns:v="urn:schemas-microsoft-com:vml" Requires="v">
-                <p:oleObj spid="_x0000_s1062" name="Equation" r:id="rId13" imgW="1993900" imgH="584200" progId="Equation.3">
+                <p:oleObj spid="_x0000_s1067" name="Equation" r:id="rId13" imgW="1930320" imgH="482400" progId="Equation.3">
                   <p:embed/>
                 </p:oleObj>
               </mc:Choice>
               <mc:Fallback>
-                <p:oleObj name="Equation" r:id="rId13" imgW="1993900" imgH="584200" progId="Equation.3">
+                <p:oleObj name="Equation" r:id="rId13" imgW="1930320" imgH="482400" progId="Equation.3">
                   <p:embed/>
                   <p:pic>
                     <p:nvPicPr>
@@ -8206,8 +8165,8 @@
                     </p:blipFill>
                     <p:spPr>
                       <a:xfrm>
-                        <a:off x="694597" y="29792372"/>
-                        <a:ext cx="9972815" cy="2662493"/>
+                        <a:off x="854075" y="30022800"/>
+                        <a:ext cx="9655175" cy="2200275"/>
                       </a:xfrm>
                       <a:prstGeom prst="rect">
                         <a:avLst/>
@@ -8709,7 +8668,7 @@
           <p:nvPr/>
         </p:nvPicPr>
         <p:blipFill>
-          <a:blip r:embed="rId17">
+          <a:blip r:embed="rId17" cstate="print">
             <a:extLst>
               <a:ext uri="{28A0092B-C50C-407E-A947-70E740481C1C}">
                 <a14:useLocalDpi xmlns:a14="http://schemas.microsoft.com/office/drawing/2010/main" val="0"/>
@@ -8743,7 +8702,7 @@
   <p:timing>
     <p:tnLst>
       <p:par>
-        <p:cTn xmlns:p14="http://schemas.microsoft.com/office/powerpoint/2010/main" id="1" dur="indefinite" restart="never" nodeType="tmRoot">
+        <p:cTn id="1" dur="indefinite" restart="never" nodeType="tmRoot">
           <p:childTnLst>
             <p:seq concurrent="1" nextAc="seek">
               <p:cTn id="2" dur="indefinite" nodeType="mainSeq">
@@ -9144,7 +9103,7 @@
   <a:extraClrSchemeLst/>
   <a:extLst>
     <a:ext uri="{05A4C25C-085E-4340-85A3-A5531E510DB2}">
-      <thm15:themeFamily xmlns:thm15="http://schemas.microsoft.com/office/thememl/2012/main" xmlns="" name="Presentation2" id="{A3AC1795-03CA-4218-8E9C-394F2C72EB71}" vid="{9E91E023-53D0-48CE-AFD1-CE3DA49243D0}"/>
+      <thm15:themeFamily xmlns="" xmlns:thm15="http://schemas.microsoft.com/office/thememl/2012/main" name="Presentation2" id="{A3AC1795-03CA-4218-8E9C-394F2C72EB71}" vid="{9E91E023-53D0-48CE-AFD1-CE3DA49243D0}"/>
     </a:ext>
   </a:extLst>
 </a:theme>
@@ -9405,7 +9364,7 @@
   <a:extraClrSchemeLst/>
   <a:extLst>
     <a:ext uri="{05A4C25C-085E-4340-85A3-A5531E510DB2}">
-      <thm15:themeFamily xmlns:thm15="http://schemas.microsoft.com/office/thememl/2012/main" xmlns="" name="Office Theme" id="{62F939B6-93AF-4DB8-9C6B-D6C7DFDC589F}" vid="{4A3C46E8-61CC-4603-A589-7422A47A8E4A}"/>
+      <thm15:themeFamily xmlns="" xmlns:thm15="http://schemas.microsoft.com/office/thememl/2012/main" name="Office Theme" id="{62F939B6-93AF-4DB8-9C6B-D6C7DFDC589F}" vid="{4A3C46E8-61CC-4603-A589-7422A47A8E4A}"/>
     </a:ext>
   </a:extLst>
 </a:theme>
@@ -9666,7 +9625,7 @@
   <a:extraClrSchemeLst/>
   <a:extLst>
     <a:ext uri="{05A4C25C-085E-4340-85A3-A5531E510DB2}">
-      <thm15:themeFamily xmlns:thm15="http://schemas.microsoft.com/office/thememl/2012/main" xmlns="" name="Office Theme" id="{62F939B6-93AF-4DB8-9C6B-D6C7DFDC589F}" vid="{4A3C46E8-61CC-4603-A589-7422A47A8E4A}"/>
+      <thm15:themeFamily xmlns="" xmlns:thm15="http://schemas.microsoft.com/office/thememl/2012/main" name="Office Theme" id="{62F939B6-93AF-4DB8-9C6B-D6C7DFDC589F}" vid="{4A3C46E8-61CC-4603-A589-7422A47A8E4A}"/>
     </a:ext>
   </a:extLst>
 </a:theme>

</xml_diff>